<commit_message>
fixed slides moviegenre, bubblechart
</commit_message>
<xml_diff>
--- a/grab_popcorn/Presentation/Grab Some Popcorn.pptx
+++ b/grab_popcorn/Presentation/Grab Some Popcorn.pptx
@@ -954,7 +954,7 @@
   <p:cSld>
     <p:spTree>
       <p:nvGrpSpPr>
-        <p:cNvPr id="135" name="Shape 135"/>
+        <p:cNvPr id="136" name="Shape 136"/>
         <p:cNvGrpSpPr/>
         <p:nvPr/>
       </p:nvGrpSpPr>
@@ -968,7 +968,7 @@
       </p:grpSpPr>
       <p:sp>
         <p:nvSpPr>
-          <p:cNvPr id="136" name="Google Shape;136;g2cb17c3f7aa_0_12:notes"/>
+          <p:cNvPr id="137" name="Google Shape;137;g2cb17c3f7aa_0_12:notes"/>
           <p:cNvSpPr/>
           <p:nvPr>
             <p:ph idx="2" type="sldImg"/>
@@ -1003,7 +1003,7 @@
       </p:sp>
       <p:sp>
         <p:nvSpPr>
-          <p:cNvPr id="137" name="Google Shape;137;g2cb17c3f7aa_0_12:notes"/>
+          <p:cNvPr id="138" name="Google Shape;138;g2cb17c3f7aa_0_12:notes"/>
           <p:cNvSpPr txBox="1"/>
           <p:nvPr>
             <p:ph idx="1" type="body"/>
@@ -1053,7 +1053,7 @@
   <p:cSld>
     <p:spTree>
       <p:nvGrpSpPr>
-        <p:cNvPr id="141" name="Shape 141"/>
+        <p:cNvPr id="143" name="Shape 143"/>
         <p:cNvGrpSpPr/>
         <p:nvPr/>
       </p:nvGrpSpPr>
@@ -1067,7 +1067,7 @@
       </p:grpSpPr>
       <p:sp>
         <p:nvSpPr>
-          <p:cNvPr id="142" name="Google Shape;142;g2cb17c3f7aa_0_18:notes"/>
+          <p:cNvPr id="144" name="Google Shape;144;g2cb17c3f7aa_0_18:notes"/>
           <p:cNvSpPr/>
           <p:nvPr>
             <p:ph idx="2" type="sldImg"/>
@@ -1102,7 +1102,7 @@
       </p:sp>
       <p:sp>
         <p:nvSpPr>
-          <p:cNvPr id="143" name="Google Shape;143;g2cb17c3f7aa_0_18:notes"/>
+          <p:cNvPr id="145" name="Google Shape;145;g2cb17c3f7aa_0_18:notes"/>
           <p:cNvSpPr txBox="1"/>
           <p:nvPr>
             <p:ph idx="1" type="body"/>
@@ -1122,254 +1122,6 @@
             <a:noAutofit/>
           </a:bodyPr>
           <a:lstStyle/>
-          <a:p>
-            <a:pPr indent="-304800" lvl="0" marL="457200" rtl="0" algn="l">
-              <a:spcBef>
-                <a:spcPts val="0"/>
-              </a:spcBef>
-              <a:spcAft>
-                <a:spcPts val="0"/>
-              </a:spcAft>
-              <a:buClr>
-                <a:srgbClr val="1F2328"/>
-              </a:buClr>
-              <a:buSzPts val="1200"/>
-              <a:buChar char="●"/>
-            </a:pPr>
-            <a:r>
-              <a:rPr lang="en" sz="1200">
-                <a:solidFill>
-                  <a:srgbClr val="1F2328"/>
-                </a:solidFill>
-                <a:highlight>
-                  <a:srgbClr val="FFFFFF"/>
-                </a:highlight>
-              </a:rPr>
-              <a:t>Interacting with the Bubble Chart. Mouse hover over the revenue circles reveals the title of the movie.</a:t>
-            </a:r>
-            <a:endParaRPr sz="1200">
-              <a:solidFill>
-                <a:srgbClr val="1F2328"/>
-              </a:solidFill>
-              <a:highlight>
-                <a:srgbClr val="FFFFFF"/>
-              </a:highlight>
-            </a:endParaRPr>
-          </a:p>
-          <a:p>
-            <a:pPr indent="-304800" lvl="0" marL="457200" rtl="0" algn="l">
-              <a:spcBef>
-                <a:spcPts val="0"/>
-              </a:spcBef>
-              <a:spcAft>
-                <a:spcPts val="0"/>
-              </a:spcAft>
-              <a:buClr>
-                <a:srgbClr val="1F2328"/>
-              </a:buClr>
-              <a:buSzPts val="1200"/>
-              <a:buChar char="●"/>
-            </a:pPr>
-            <a:r>
-              <a:rPr lang="en" sz="1200">
-                <a:solidFill>
-                  <a:srgbClr val="1F2328"/>
-                </a:solidFill>
-                <a:highlight>
-                  <a:srgbClr val="FFFFFF"/>
-                </a:highlight>
-              </a:rPr>
-              <a:t>While the team was proficient in using visualization tools such as Leaflet and Plotly prior to this project. For this project in particular, the team chose to learn visualizations with D3.js in particular due to customization options like mouse hover text as well as the </a:t>
-            </a:r>
-            <a:r>
-              <a:rPr lang="en" sz="1200">
-                <a:solidFill>
-                  <a:srgbClr val="1F2328"/>
-                </a:solidFill>
-                <a:highlight>
-                  <a:srgbClr val="FFFFFF"/>
-                </a:highlight>
-              </a:rPr>
-              <a:t>comprehensive</a:t>
-            </a:r>
-            <a:r>
-              <a:rPr lang="en" sz="1200">
-                <a:solidFill>
-                  <a:srgbClr val="1F2328"/>
-                </a:solidFill>
-                <a:highlight>
-                  <a:srgbClr val="FFFFFF"/>
-                </a:highlight>
-              </a:rPr>
-              <a:t> tutorials and documentation available for visualizations with D3.js. </a:t>
-            </a:r>
-            <a:endParaRPr sz="1200">
-              <a:solidFill>
-                <a:srgbClr val="1F2328"/>
-              </a:solidFill>
-              <a:highlight>
-                <a:srgbClr val="FFFFFF"/>
-              </a:highlight>
-            </a:endParaRPr>
-          </a:p>
-          <a:p>
-            <a:pPr indent="0" lvl="0" marL="0" rtl="0" algn="l">
-              <a:spcBef>
-                <a:spcPts val="0"/>
-              </a:spcBef>
-              <a:spcAft>
-                <a:spcPts val="0"/>
-              </a:spcAft>
-              <a:buNone/>
-            </a:pPr>
-            <a:r>
-              <a:t/>
-            </a:r>
-            <a:endParaRPr sz="1200">
-              <a:solidFill>
-                <a:srgbClr val="1F2328"/>
-              </a:solidFill>
-              <a:highlight>
-                <a:srgbClr val="FFFFFF"/>
-              </a:highlight>
-            </a:endParaRPr>
-          </a:p>
-          <a:p>
-            <a:pPr indent="0" lvl="0" marL="0" rtl="0" algn="l">
-              <a:spcBef>
-                <a:spcPts val="0"/>
-              </a:spcBef>
-              <a:spcAft>
-                <a:spcPts val="0"/>
-              </a:spcAft>
-              <a:buClr>
-                <a:schemeClr val="dk1"/>
-              </a:buClr>
-              <a:buSzPts val="1100"/>
-              <a:buFont typeface="Arial"/>
-              <a:buNone/>
-            </a:pPr>
-            <a:r>
-              <a:rPr lang="en">
-                <a:solidFill>
-                  <a:schemeClr val="dk1"/>
-                </a:solidFill>
-              </a:rPr>
-              <a:t>New library learned d3.js Why? Customization options like animations, colors, comprehensive tutorials and documentation. </a:t>
-            </a:r>
-            <a:endParaRPr>
-              <a:solidFill>
-                <a:schemeClr val="dk1"/>
-              </a:solidFill>
-            </a:endParaRPr>
-          </a:p>
-          <a:p>
-            <a:pPr indent="0" lvl="0" marL="0" rtl="0" algn="l">
-              <a:spcBef>
-                <a:spcPts val="0"/>
-              </a:spcBef>
-              <a:spcAft>
-                <a:spcPts val="0"/>
-              </a:spcAft>
-              <a:buClr>
-                <a:schemeClr val="dk1"/>
-              </a:buClr>
-              <a:buSzPts val="1100"/>
-              <a:buFont typeface="Arial"/>
-              <a:buNone/>
-            </a:pPr>
-            <a:r>
-              <a:t/>
-            </a:r>
-            <a:endParaRPr>
-              <a:solidFill>
-                <a:schemeClr val="dk1"/>
-              </a:solidFill>
-            </a:endParaRPr>
-          </a:p>
-          <a:p>
-            <a:pPr indent="0" lvl="0" marL="0" rtl="0" algn="l">
-              <a:spcBef>
-                <a:spcPts val="0"/>
-              </a:spcBef>
-              <a:spcAft>
-                <a:spcPts val="0"/>
-              </a:spcAft>
-              <a:buClr>
-                <a:schemeClr val="dk1"/>
-              </a:buClr>
-              <a:buSzPts val="1100"/>
-              <a:buFont typeface="Arial"/>
-              <a:buNone/>
-            </a:pPr>
-            <a:r>
-              <a:t/>
-            </a:r>
-            <a:endParaRPr>
-              <a:solidFill>
-                <a:schemeClr val="dk1"/>
-              </a:solidFill>
-            </a:endParaRPr>
-          </a:p>
-          <a:p>
-            <a:pPr indent="0" lvl="0" marL="0" rtl="0" algn="l">
-              <a:spcBef>
-                <a:spcPts val="0"/>
-              </a:spcBef>
-              <a:spcAft>
-                <a:spcPts val="0"/>
-              </a:spcAft>
-              <a:buClr>
-                <a:schemeClr val="dk1"/>
-              </a:buClr>
-              <a:buSzPts val="1100"/>
-              <a:buFont typeface="Arial"/>
-              <a:buNone/>
-            </a:pPr>
-            <a:r>
-              <a:rPr lang="en" u="sng">
-                <a:solidFill>
-                  <a:schemeClr val="hlink"/>
-                </a:solidFill>
-                <a:hlinkClick r:id="rId2"/>
-              </a:rPr>
-              <a:t>https://observablehq.com/@d3/scatterplot-tour?intent=fork</a:t>
-            </a:r>
-            <a:endParaRPr>
-              <a:solidFill>
-                <a:schemeClr val="dk1"/>
-              </a:solidFill>
-            </a:endParaRPr>
-          </a:p>
-          <a:p>
-            <a:pPr indent="0" lvl="0" marL="0" rtl="0" algn="l">
-              <a:spcBef>
-                <a:spcPts val="0"/>
-              </a:spcBef>
-              <a:spcAft>
-                <a:spcPts val="0"/>
-              </a:spcAft>
-              <a:buClr>
-                <a:schemeClr val="dk1"/>
-              </a:buClr>
-              <a:buSzPts val="1100"/>
-              <a:buFont typeface="Arial"/>
-              <a:buNone/>
-            </a:pPr>
-            <a:r>
-              <a:rPr lang="en">
-                <a:solidFill>
-                  <a:schemeClr val="dk1"/>
-                </a:solidFill>
-              </a:rPr>
-              <a:t>https://d3js.org/getting-started#try-d3-online</a:t>
-            </a:r>
-            <a:endParaRPr>
-              <a:solidFill>
-                <a:schemeClr val="dk1"/>
-              </a:solidFill>
-            </a:endParaRPr>
-          </a:p>
           <a:p>
             <a:pPr indent="0" lvl="0" marL="0" rtl="0" algn="l">
               <a:spcBef>
@@ -1407,7 +1159,7 @@
   <p:cSld>
     <p:spTree>
       <p:nvGrpSpPr>
-        <p:cNvPr id="147" name="Shape 147"/>
+        <p:cNvPr id="149" name="Shape 149"/>
         <p:cNvGrpSpPr/>
         <p:nvPr/>
       </p:nvGrpSpPr>
@@ -1421,7 +1173,7 @@
       </p:grpSpPr>
       <p:sp>
         <p:nvSpPr>
-          <p:cNvPr id="148" name="Google Shape;148;gcb9a0b074_2_0:notes"/>
+          <p:cNvPr id="150" name="Google Shape;150;gcb9a0b074_2_0:notes"/>
           <p:cNvSpPr/>
           <p:nvPr>
             <p:ph idx="2" type="sldImg"/>
@@ -1456,7 +1208,7 @@
       </p:sp>
       <p:sp>
         <p:nvSpPr>
-          <p:cNvPr id="149" name="Google Shape;149;gcb9a0b074_2_0:notes"/>
+          <p:cNvPr id="151" name="Google Shape;151;gcb9a0b074_2_0:notes"/>
           <p:cNvSpPr txBox="1"/>
           <p:nvPr>
             <p:ph idx="1" type="body"/>
@@ -8448,13 +8200,13 @@
           <a:blip r:embed="rId3">
             <a:alphaModFix/>
           </a:blip>
-          <a:srcRect b="0" l="0" r="0" t="16701"/>
+          <a:srcRect b="8621" l="9265" r="54695" t="11994"/>
           <a:stretch/>
         </p:blipFill>
         <p:spPr>
           <a:xfrm>
-            <a:off x="421898" y="872075"/>
-            <a:ext cx="8163401" cy="4119025"/>
+            <a:off x="808025" y="934225"/>
+            <a:ext cx="6751826" cy="3948751"/>
           </a:xfrm>
           <a:prstGeom prst="rect">
             <a:avLst/>
@@ -8465,6 +8217,53 @@
           </a:ln>
         </p:spPr>
       </p:pic>
+      <p:sp>
+        <p:nvSpPr>
+          <p:cNvPr id="135" name="Google Shape;135;p22"/>
+          <p:cNvSpPr/>
+          <p:nvPr/>
+        </p:nvSpPr>
+        <p:spPr>
+          <a:xfrm>
+            <a:off x="2819751" y="4048798"/>
+            <a:ext cx="373500" cy="325500"/>
+          </a:xfrm>
+          <a:prstGeom prst="ellipse">
+            <a:avLst/>
+          </a:prstGeom>
+          <a:noFill/>
+          <a:ln cap="flat" cmpd="sng" w="19050">
+            <a:solidFill>
+              <a:srgbClr val="FF0000"/>
+            </a:solidFill>
+            <a:prstDash val="solid"/>
+            <a:round/>
+            <a:headEnd len="sm" w="sm" type="none"/>
+            <a:tailEnd len="sm" w="sm" type="none"/>
+          </a:ln>
+        </p:spPr>
+        <p:txBody>
+          <a:bodyPr anchorCtr="0" anchor="ctr" bIns="91425" lIns="91425" spcFirstLastPara="1" rIns="91425" wrap="square" tIns="91425">
+            <a:noAutofit/>
+          </a:bodyPr>
+          <a:lstStyle/>
+          <a:p>
+            <a:pPr indent="0" lvl="0" marL="0" rtl="0" algn="ctr">
+              <a:spcBef>
+                <a:spcPts val="0"/>
+              </a:spcBef>
+              <a:spcAft>
+                <a:spcPts val="0"/>
+              </a:spcAft>
+              <a:buNone/>
+            </a:pPr>
+            <a:r>
+              <a:t/>
+            </a:r>
+            <a:endParaRPr/>
+          </a:p>
+        </p:txBody>
+      </p:sp>
     </p:spTree>
   </p:cSld>
   <p:clrMapOvr>
@@ -8478,7 +8277,7 @@
   <p:cSld>
     <p:spTree>
       <p:nvGrpSpPr>
-        <p:cNvPr id="138" name="Shape 138"/>
+        <p:cNvPr id="139" name="Shape 139"/>
         <p:cNvGrpSpPr/>
         <p:nvPr/>
       </p:nvGrpSpPr>
@@ -8492,7 +8291,7 @@
       </p:grpSpPr>
       <p:sp>
         <p:nvSpPr>
-          <p:cNvPr id="139" name="Google Shape;139;p23"/>
+          <p:cNvPr id="140" name="Google Shape;140;p23"/>
           <p:cNvSpPr txBox="1"/>
           <p:nvPr>
             <p:ph type="title"/>
@@ -8537,7 +8336,7 @@
       </p:sp>
       <p:pic>
         <p:nvPicPr>
-          <p:cNvPr id="140" name="Google Shape;140;p23"/>
+          <p:cNvPr id="141" name="Google Shape;141;p23"/>
           <p:cNvPicPr preferRelativeResize="0"/>
           <p:nvPr/>
         </p:nvPicPr>
@@ -8545,13 +8344,13 @@
           <a:blip r:embed="rId3">
             <a:alphaModFix/>
           </a:blip>
-          <a:srcRect b="0" l="0" r="0" t="16492"/>
+          <a:srcRect b="8310" l="12573" r="53352" t="11931"/>
           <a:stretch/>
         </p:blipFill>
         <p:spPr>
           <a:xfrm>
-            <a:off x="247650" y="909048"/>
-            <a:ext cx="8648700" cy="4143975"/>
+            <a:off x="893500" y="882025"/>
+            <a:ext cx="7062600" cy="3994924"/>
           </a:xfrm>
           <a:prstGeom prst="rect">
             <a:avLst/>
@@ -8562,6 +8361,53 @@
           </a:ln>
         </p:spPr>
       </p:pic>
+      <p:sp>
+        <p:nvSpPr>
+          <p:cNvPr id="142" name="Google Shape;142;p23"/>
+          <p:cNvSpPr/>
+          <p:nvPr/>
+        </p:nvSpPr>
+        <p:spPr>
+          <a:xfrm>
+            <a:off x="2874775" y="1903575"/>
+            <a:ext cx="380700" cy="279900"/>
+          </a:xfrm>
+          <a:prstGeom prst="ellipse">
+            <a:avLst/>
+          </a:prstGeom>
+          <a:noFill/>
+          <a:ln cap="flat" cmpd="sng" w="19050">
+            <a:solidFill>
+              <a:srgbClr val="FF0000"/>
+            </a:solidFill>
+            <a:prstDash val="solid"/>
+            <a:round/>
+            <a:headEnd len="sm" w="sm" type="none"/>
+            <a:tailEnd len="sm" w="sm" type="none"/>
+          </a:ln>
+        </p:spPr>
+        <p:txBody>
+          <a:bodyPr anchorCtr="0" anchor="ctr" bIns="91425" lIns="91425" spcFirstLastPara="1" rIns="91425" wrap="square" tIns="91425">
+            <a:noAutofit/>
+          </a:bodyPr>
+          <a:lstStyle/>
+          <a:p>
+            <a:pPr indent="0" lvl="0" marL="0" rtl="0" algn="ctr">
+              <a:spcBef>
+                <a:spcPts val="0"/>
+              </a:spcBef>
+              <a:spcAft>
+                <a:spcPts val="0"/>
+              </a:spcAft>
+              <a:buNone/>
+            </a:pPr>
+            <a:r>
+              <a:t/>
+            </a:r>
+            <a:endParaRPr/>
+          </a:p>
+        </p:txBody>
+      </p:sp>
     </p:spTree>
   </p:cSld>
   <p:clrMapOvr>
@@ -8575,7 +8421,7 @@
   <p:cSld>
     <p:spTree>
       <p:nvGrpSpPr>
-        <p:cNvPr id="144" name="Shape 144"/>
+        <p:cNvPr id="146" name="Shape 146"/>
         <p:cNvGrpSpPr/>
         <p:nvPr/>
       </p:nvGrpSpPr>
@@ -8589,7 +8435,7 @@
       </p:grpSpPr>
       <p:sp>
         <p:nvSpPr>
-          <p:cNvPr id="145" name="Google Shape;145;p24"/>
+          <p:cNvPr id="147" name="Google Shape;147;p24"/>
           <p:cNvSpPr txBox="1"/>
           <p:nvPr>
             <p:ph type="title"/>
@@ -8634,22 +8480,21 @@
       </p:sp>
       <p:pic>
         <p:nvPicPr>
-          <p:cNvPr id="146" name="Google Shape;146;p24"/>
+          <p:cNvPr id="148" name="Google Shape;148;p24"/>
           <p:cNvPicPr preferRelativeResize="0"/>
           <p:nvPr/>
         </p:nvPicPr>
-        <p:blipFill>
+        <p:blipFill rotWithShape="1">
           <a:blip r:embed="rId3">
             <a:alphaModFix/>
           </a:blip>
-          <a:stretch>
-            <a:fillRect/>
-          </a:stretch>
+          <a:srcRect b="7184" l="9942" r="55220" t="12455"/>
+          <a:stretch/>
         </p:blipFill>
         <p:spPr>
           <a:xfrm>
-            <a:off x="1097525" y="1004600"/>
-            <a:ext cx="6937550" cy="3928600"/>
+            <a:off x="753650" y="871625"/>
+            <a:ext cx="6946074" cy="4135375"/>
           </a:xfrm>
           <a:prstGeom prst="rect">
             <a:avLst/>
@@ -8673,7 +8518,7 @@
   <p:cSld>
     <p:spTree>
       <p:nvGrpSpPr>
-        <p:cNvPr id="150" name="Shape 150"/>
+        <p:cNvPr id="152" name="Shape 152"/>
         <p:cNvGrpSpPr/>
         <p:nvPr/>
       </p:nvGrpSpPr>
@@ -8687,7 +8532,7 @@
       </p:grpSpPr>
       <p:sp>
         <p:nvSpPr>
-          <p:cNvPr id="151" name="Google Shape;151;p25"/>
+          <p:cNvPr id="153" name="Google Shape;153;p25"/>
           <p:cNvSpPr txBox="1"/>
           <p:nvPr>
             <p:ph type="title"/>
@@ -8727,7 +8572,7 @@
       </p:sp>
       <p:sp>
         <p:nvSpPr>
-          <p:cNvPr id="152" name="Google Shape;152;p25"/>
+          <p:cNvPr id="154" name="Google Shape;154;p25"/>
           <p:cNvSpPr/>
           <p:nvPr/>
         </p:nvSpPr>
@@ -8773,7 +8618,7 @@
       </p:sp>
       <p:sp>
         <p:nvSpPr>
-          <p:cNvPr id="153" name="Google Shape;153;p25"/>
+          <p:cNvPr id="155" name="Google Shape;155;p25"/>
           <p:cNvSpPr/>
           <p:nvPr/>
         </p:nvSpPr>
@@ -8819,7 +8664,7 @@
       </p:sp>
       <p:sp>
         <p:nvSpPr>
-          <p:cNvPr id="154" name="Google Shape;154;p25"/>
+          <p:cNvPr id="156" name="Google Shape;156;p25"/>
           <p:cNvSpPr/>
           <p:nvPr/>
         </p:nvSpPr>
@@ -8865,7 +8710,7 @@
       </p:sp>
       <p:sp>
         <p:nvSpPr>
-          <p:cNvPr id="155" name="Google Shape;155;p25"/>
+          <p:cNvPr id="157" name="Google Shape;157;p25"/>
           <p:cNvSpPr txBox="1"/>
           <p:nvPr>
             <p:ph type="title"/>
@@ -8925,7 +8770,7 @@
       </p:sp>
       <p:sp>
         <p:nvSpPr>
-          <p:cNvPr id="156" name="Google Shape;156;p25"/>
+          <p:cNvPr id="158" name="Google Shape;158;p25"/>
           <p:cNvSpPr txBox="1"/>
           <p:nvPr>
             <p:ph type="title"/>
@@ -8981,7 +8826,7 @@
       </p:sp>
       <p:sp>
         <p:nvSpPr>
-          <p:cNvPr id="157" name="Google Shape;157;p25"/>
+          <p:cNvPr id="159" name="Google Shape;159;p25"/>
           <p:cNvSpPr txBox="1"/>
           <p:nvPr>
             <p:ph type="title"/>

</xml_diff>